<commit_message>
week 6-7 slides 2024 update
</commit_message>
<xml_diff>
--- a/lecture-slides_upload/lab-activity/6-LinReg-output.pptx
+++ b/lecture-slides_upload/lab-activity/6-LinReg-output.pptx
@@ -274,7 +274,7 @@
           <a:p>
             <a:fld id="{9348304A-BD4A-884F-8142-E1638F7E50E4}" type="datetimeFigureOut">
               <a:rPr lang="en-US" smtClean="0"/>
-              <a:t>10/13/22</a:t>
+              <a:t>2/22/24</a:t>
             </a:fld>
             <a:endParaRPr lang="en-US"/>
           </a:p>
@@ -472,7 +472,7 @@
           <a:p>
             <a:fld id="{9348304A-BD4A-884F-8142-E1638F7E50E4}" type="datetimeFigureOut">
               <a:rPr lang="en-US" smtClean="0"/>
-              <a:t>10/13/22</a:t>
+              <a:t>2/22/24</a:t>
             </a:fld>
             <a:endParaRPr lang="en-US"/>
           </a:p>
@@ -680,7 +680,7 @@
           <a:p>
             <a:fld id="{9348304A-BD4A-884F-8142-E1638F7E50E4}" type="datetimeFigureOut">
               <a:rPr lang="en-US" smtClean="0"/>
-              <a:t>10/13/22</a:t>
+              <a:t>2/22/24</a:t>
             </a:fld>
             <a:endParaRPr lang="en-US"/>
           </a:p>
@@ -878,7 +878,7 @@
           <a:p>
             <a:fld id="{9348304A-BD4A-884F-8142-E1638F7E50E4}" type="datetimeFigureOut">
               <a:rPr lang="en-US" smtClean="0"/>
-              <a:t>10/13/22</a:t>
+              <a:t>2/22/24</a:t>
             </a:fld>
             <a:endParaRPr lang="en-US"/>
           </a:p>
@@ -1153,7 +1153,7 @@
           <a:p>
             <a:fld id="{9348304A-BD4A-884F-8142-E1638F7E50E4}" type="datetimeFigureOut">
               <a:rPr lang="en-US" smtClean="0"/>
-              <a:t>10/13/22</a:t>
+              <a:t>2/22/24</a:t>
             </a:fld>
             <a:endParaRPr lang="en-US"/>
           </a:p>
@@ -1418,7 +1418,7 @@
           <a:p>
             <a:fld id="{9348304A-BD4A-884F-8142-E1638F7E50E4}" type="datetimeFigureOut">
               <a:rPr lang="en-US" smtClean="0"/>
-              <a:t>10/13/22</a:t>
+              <a:t>2/22/24</a:t>
             </a:fld>
             <a:endParaRPr lang="en-US"/>
           </a:p>
@@ -1830,7 +1830,7 @@
           <a:p>
             <a:fld id="{9348304A-BD4A-884F-8142-E1638F7E50E4}" type="datetimeFigureOut">
               <a:rPr lang="en-US" smtClean="0"/>
-              <a:t>10/13/22</a:t>
+              <a:t>2/22/24</a:t>
             </a:fld>
             <a:endParaRPr lang="en-US"/>
           </a:p>
@@ -1971,7 +1971,7 @@
           <a:p>
             <a:fld id="{9348304A-BD4A-884F-8142-E1638F7E50E4}" type="datetimeFigureOut">
               <a:rPr lang="en-US" smtClean="0"/>
-              <a:t>10/13/22</a:t>
+              <a:t>2/22/24</a:t>
             </a:fld>
             <a:endParaRPr lang="en-US"/>
           </a:p>
@@ -2084,7 +2084,7 @@
           <a:p>
             <a:fld id="{9348304A-BD4A-884F-8142-E1638F7E50E4}" type="datetimeFigureOut">
               <a:rPr lang="en-US" smtClean="0"/>
-              <a:t>10/13/22</a:t>
+              <a:t>2/22/24</a:t>
             </a:fld>
             <a:endParaRPr lang="en-US"/>
           </a:p>
@@ -2395,7 +2395,7 @@
           <a:p>
             <a:fld id="{9348304A-BD4A-884F-8142-E1638F7E50E4}" type="datetimeFigureOut">
               <a:rPr lang="en-US" smtClean="0"/>
-              <a:t>10/13/22</a:t>
+              <a:t>2/22/24</a:t>
             </a:fld>
             <a:endParaRPr lang="en-US"/>
           </a:p>
@@ -2683,7 +2683,7 @@
           <a:p>
             <a:fld id="{9348304A-BD4A-884F-8142-E1638F7E50E4}" type="datetimeFigureOut">
               <a:rPr lang="en-US" smtClean="0"/>
-              <a:t>10/13/22</a:t>
+              <a:t>2/22/24</a:t>
             </a:fld>
             <a:endParaRPr lang="en-US"/>
           </a:p>
@@ -2924,7 +2924,7 @@
           <a:p>
             <a:fld id="{9348304A-BD4A-884F-8142-E1638F7E50E4}" type="datetimeFigureOut">
               <a:rPr lang="en-US" smtClean="0"/>
-              <a:t>10/13/22</a:t>
+              <a:t>2/22/24</a:t>
             </a:fld>
             <a:endParaRPr lang="en-US"/>
           </a:p>
@@ -3399,13 +3399,27 @@
           <a:p>
             <a:r>
               <a:rPr lang="en-US" dirty="0"/>
-              <a:t>Statistical Methods Fall 2022</a:t>
+              <a:t>Statistical Methods Fall 2024</a:t>
             </a:r>
           </a:p>
           <a:p>
             <a:r>
               <a:rPr lang="en-US" dirty="0"/>
-              <a:t>Jamil Palacios Bhanji and Vanessa </a:t>
+              <a:t>Jamil Palacios </a:t>
+            </a:r>
+            <a:r>
+              <a:rPr lang="en-US" dirty="0" err="1"/>
+              <a:t>Bhanji</a:t>
+            </a:r>
+            <a:r>
+              <a:rPr lang="en-US" dirty="0"/>
+              <a:t> </a:t>
+            </a:r>
+          </a:p>
+          <a:p>
+            <a:r>
+              <a:rPr lang="en-US" dirty="0"/>
+              <a:t>with contributions from Vanessa </a:t>
             </a:r>
             <a:r>
               <a:rPr lang="en-US" dirty="0" err="1"/>

</xml_diff>